<commit_message>
Change probe plotting function and color scheme
Update EBL128_map_to_Ripple.pptx file
Delete redundant EBL128-channel map black flex cable.xlsx file
</commit_message>
<xml_diff>
--- a/EBL128_map_to_Ripple.pptx
+++ b/EBL128_map_to_Ripple.pptx
@@ -116,6 +116,11 @@
       </a:defRPr>
     </a:lvl9pPr>
   </p:defaultTextStyle>
+  <p:extLst>
+    <p:ext uri="{EFAFB233-063F-42B5-8137-9DF3F51BA10A}">
+      <p15:sldGuideLst xmlns:p15="http://schemas.microsoft.com/office/powerpoint/2012/main"/>
+    </p:ext>
+  </p:extLst>
 </p:presentation>
 </file>
 
@@ -266,7 +271,7 @@
           <a:p>
             <a:fld id="{7FE4E324-3EEB-4318-8850-6708ED24F875}" type="datetimeFigureOut">
               <a:rPr lang="en-US" smtClean="0"/>
-              <a:t>10/22/2023</a:t>
+              <a:t>10/23/2023</a:t>
             </a:fld>
             <a:endParaRPr lang="en-US"/>
           </a:p>
@@ -464,7 +469,7 @@
           <a:p>
             <a:fld id="{7FE4E324-3EEB-4318-8850-6708ED24F875}" type="datetimeFigureOut">
               <a:rPr lang="en-US" smtClean="0"/>
-              <a:t>10/22/2023</a:t>
+              <a:t>10/23/2023</a:t>
             </a:fld>
             <a:endParaRPr lang="en-US"/>
           </a:p>
@@ -672,7 +677,7 @@
           <a:p>
             <a:fld id="{7FE4E324-3EEB-4318-8850-6708ED24F875}" type="datetimeFigureOut">
               <a:rPr lang="en-US" smtClean="0"/>
-              <a:t>10/22/2023</a:t>
+              <a:t>10/23/2023</a:t>
             </a:fld>
             <a:endParaRPr lang="en-US"/>
           </a:p>
@@ -870,7 +875,7 @@
           <a:p>
             <a:fld id="{7FE4E324-3EEB-4318-8850-6708ED24F875}" type="datetimeFigureOut">
               <a:rPr lang="en-US" smtClean="0"/>
-              <a:t>10/22/2023</a:t>
+              <a:t>10/23/2023</a:t>
             </a:fld>
             <a:endParaRPr lang="en-US"/>
           </a:p>
@@ -1145,7 +1150,7 @@
           <a:p>
             <a:fld id="{7FE4E324-3EEB-4318-8850-6708ED24F875}" type="datetimeFigureOut">
               <a:rPr lang="en-US" smtClean="0"/>
-              <a:t>10/22/2023</a:t>
+              <a:t>10/23/2023</a:t>
             </a:fld>
             <a:endParaRPr lang="en-US"/>
           </a:p>
@@ -1410,7 +1415,7 @@
           <a:p>
             <a:fld id="{7FE4E324-3EEB-4318-8850-6708ED24F875}" type="datetimeFigureOut">
               <a:rPr lang="en-US" smtClean="0"/>
-              <a:t>10/22/2023</a:t>
+              <a:t>10/23/2023</a:t>
             </a:fld>
             <a:endParaRPr lang="en-US"/>
           </a:p>
@@ -1822,7 +1827,7 @@
           <a:p>
             <a:fld id="{7FE4E324-3EEB-4318-8850-6708ED24F875}" type="datetimeFigureOut">
               <a:rPr lang="en-US" smtClean="0"/>
-              <a:t>10/22/2023</a:t>
+              <a:t>10/23/2023</a:t>
             </a:fld>
             <a:endParaRPr lang="en-US"/>
           </a:p>
@@ -1963,7 +1968,7 @@
           <a:p>
             <a:fld id="{7FE4E324-3EEB-4318-8850-6708ED24F875}" type="datetimeFigureOut">
               <a:rPr lang="en-US" smtClean="0"/>
-              <a:t>10/22/2023</a:t>
+              <a:t>10/23/2023</a:t>
             </a:fld>
             <a:endParaRPr lang="en-US"/>
           </a:p>
@@ -2076,7 +2081,7 @@
           <a:p>
             <a:fld id="{7FE4E324-3EEB-4318-8850-6708ED24F875}" type="datetimeFigureOut">
               <a:rPr lang="en-US" smtClean="0"/>
-              <a:t>10/22/2023</a:t>
+              <a:t>10/23/2023</a:t>
             </a:fld>
             <a:endParaRPr lang="en-US"/>
           </a:p>
@@ -2387,7 +2392,7 @@
           <a:p>
             <a:fld id="{7FE4E324-3EEB-4318-8850-6708ED24F875}" type="datetimeFigureOut">
               <a:rPr lang="en-US" smtClean="0"/>
-              <a:t>10/22/2023</a:t>
+              <a:t>10/23/2023</a:t>
             </a:fld>
             <a:endParaRPr lang="en-US"/>
           </a:p>
@@ -2675,7 +2680,7 @@
           <a:p>
             <a:fld id="{7FE4E324-3EEB-4318-8850-6708ED24F875}" type="datetimeFigureOut">
               <a:rPr lang="en-US" smtClean="0"/>
-              <a:t>10/22/2023</a:t>
+              <a:t>10/23/2023</a:t>
             </a:fld>
             <a:endParaRPr lang="en-US"/>
           </a:p>
@@ -2916,7 +2921,7 @@
           <a:p>
             <a:fld id="{7FE4E324-3EEB-4318-8850-6708ED24F875}" type="datetimeFigureOut">
               <a:rPr lang="en-US" smtClean="0"/>
-              <a:t>10/22/2023</a:t>
+              <a:t>10/23/2023</a:t>
             </a:fld>
             <a:endParaRPr lang="en-US"/>
           </a:p>
@@ -3333,12 +3338,47 @@
           <a:chExt cx="0" cy="0"/>
         </a:xfrm>
       </p:grpSpPr>
+      <p:sp>
+        <p:nvSpPr>
+          <p:cNvPr id="6" name="TextBox 5">
+            <a:extLst>
+              <a:ext uri="{FF2B5EF4-FFF2-40B4-BE49-F238E27FC236}">
+                <a16:creationId xmlns:a16="http://schemas.microsoft.com/office/drawing/2014/main" id="{B057E69A-006F-2029-5062-33D67CA5D40F}"/>
+              </a:ext>
+            </a:extLst>
+          </p:cNvPr>
+          <p:cNvSpPr txBox="1"/>
+          <p:nvPr/>
+        </p:nvSpPr>
+        <p:spPr>
+          <a:xfrm>
+            <a:off x="1366261" y="3118282"/>
+            <a:ext cx="2139518" cy="369332"/>
+          </a:xfrm>
+          <a:prstGeom prst="rect">
+            <a:avLst/>
+          </a:prstGeom>
+          <a:noFill/>
+        </p:spPr>
+        <p:txBody>
+          <a:bodyPr wrap="square" rtlCol="0">
+            <a:spAutoFit/>
+          </a:bodyPr>
+          <a:lstStyle/>
+          <a:p>
+            <a:r>
+              <a:rPr lang="en-US" dirty="0"/>
+              <a:t>Electrode IDs</a:t>
+            </a:r>
+          </a:p>
+        </p:txBody>
+      </p:sp>
       <p:pic>
         <p:nvPicPr>
-          <p:cNvPr id="5" name="Picture 4">
-            <a:extLst>
-              <a:ext uri="{FF2B5EF4-FFF2-40B4-BE49-F238E27FC236}">
-                <a16:creationId xmlns:a16="http://schemas.microsoft.com/office/drawing/2014/main" id="{884980AB-7FF9-A641-A567-1D5C5F47DB2E}"/>
+          <p:cNvPr id="3" name="Picture 2" descr="A vertical chart with numbers and a ruler&#10;&#10;Description automatically generated with medium confidence">
+            <a:extLst>
+              <a:ext uri="{FF2B5EF4-FFF2-40B4-BE49-F238E27FC236}">
+                <a16:creationId xmlns:a16="http://schemas.microsoft.com/office/drawing/2014/main" id="{977790F9-364E-F2DB-4DB6-8E7E2F7D9C37}"/>
               </a:ext>
             </a:extLst>
           </p:cNvPr>
@@ -3348,56 +3388,27 @@
           <p:nvPr/>
         </p:nvPicPr>
         <p:blipFill>
-          <a:blip r:embed="rId2"/>
+          <a:blip r:embed="rId2">
+            <a:extLst>
+              <a:ext uri="{28A0092B-C50C-407E-A947-70E740481C1C}">
+                <a14:useLocalDpi xmlns:a14="http://schemas.microsoft.com/office/drawing/2010/main" val="0"/>
+              </a:ext>
+            </a:extLst>
+          </a:blip>
           <a:stretch>
             <a:fillRect/>
           </a:stretch>
         </p:blipFill>
         <p:spPr>
           <a:xfrm>
-            <a:off x="3505779" y="0"/>
-            <a:ext cx="5180441" cy="6858000"/>
+            <a:off x="3524250" y="0"/>
+            <a:ext cx="5143500" cy="6858000"/>
           </a:xfrm>
           <a:prstGeom prst="rect">
             <a:avLst/>
           </a:prstGeom>
         </p:spPr>
       </p:pic>
-      <p:sp>
-        <p:nvSpPr>
-          <p:cNvPr id="6" name="TextBox 5">
-            <a:extLst>
-              <a:ext uri="{FF2B5EF4-FFF2-40B4-BE49-F238E27FC236}">
-                <a16:creationId xmlns:a16="http://schemas.microsoft.com/office/drawing/2014/main" id="{B057E69A-006F-2029-5062-33D67CA5D40F}"/>
-              </a:ext>
-            </a:extLst>
-          </p:cNvPr>
-          <p:cNvSpPr txBox="1"/>
-          <p:nvPr/>
-        </p:nvSpPr>
-        <p:spPr>
-          <a:xfrm>
-            <a:off x="1366261" y="3118282"/>
-            <a:ext cx="2139518" cy="369332"/>
-          </a:xfrm>
-          <a:prstGeom prst="rect">
-            <a:avLst/>
-          </a:prstGeom>
-          <a:noFill/>
-        </p:spPr>
-        <p:txBody>
-          <a:bodyPr wrap="square" rtlCol="0">
-            <a:spAutoFit/>
-          </a:bodyPr>
-          <a:lstStyle/>
-          <a:p>
-            <a:r>
-              <a:rPr lang="en-US" dirty="0"/>
-              <a:t>Electrode IDs</a:t>
-            </a:r>
-          </a:p>
-        </p:txBody>
-      </p:sp>
     </p:spTree>
     <p:extLst>
       <p:ext uri="{BB962C8B-B14F-4D97-AF65-F5344CB8AC3E}">
@@ -3607,10 +3618,10 @@
       </p:grpSpPr>
       <p:pic>
         <p:nvPicPr>
-          <p:cNvPr id="4" name="Picture 3">
-            <a:extLst>
-              <a:ext uri="{FF2B5EF4-FFF2-40B4-BE49-F238E27FC236}">
-                <a16:creationId xmlns:a16="http://schemas.microsoft.com/office/drawing/2014/main" id="{42E52CFB-9522-BC2D-686C-1E7A809C16AF}"/>
+          <p:cNvPr id="5" name="Picture 4">
+            <a:extLst>
+              <a:ext uri="{FF2B5EF4-FFF2-40B4-BE49-F238E27FC236}">
+                <a16:creationId xmlns:a16="http://schemas.microsoft.com/office/drawing/2014/main" id="{7F37CF42-DF2B-C0B0-78A6-70512B582E79}"/>
               </a:ext>
             </a:extLst>
           </p:cNvPr>
@@ -3627,8 +3638,8 @@
         </p:blipFill>
         <p:spPr>
           <a:xfrm>
-            <a:off x="998651" y="0"/>
-            <a:ext cx="5180441" cy="6858000"/>
+            <a:off x="6474551" y="255648"/>
+            <a:ext cx="4238625" cy="6257925"/>
           </a:xfrm>
           <a:prstGeom prst="rect">
             <a:avLst/>
@@ -3637,10 +3648,10 @@
       </p:pic>
       <p:pic>
         <p:nvPicPr>
-          <p:cNvPr id="5" name="Picture 4">
-            <a:extLst>
-              <a:ext uri="{FF2B5EF4-FFF2-40B4-BE49-F238E27FC236}">
-                <a16:creationId xmlns:a16="http://schemas.microsoft.com/office/drawing/2014/main" id="{7F37CF42-DF2B-C0B0-78A6-70512B582E79}"/>
+          <p:cNvPr id="3" name="Picture 2" descr="A vertical chart with numbers and a ruler&#10;&#10;Description automatically generated with medium confidence">
+            <a:extLst>
+              <a:ext uri="{FF2B5EF4-FFF2-40B4-BE49-F238E27FC236}">
+                <a16:creationId xmlns:a16="http://schemas.microsoft.com/office/drawing/2014/main" id="{A9218331-284B-9CFC-AEB8-BD1370BF77B9}"/>
               </a:ext>
             </a:extLst>
           </p:cNvPr>
@@ -3650,15 +3661,21 @@
           <p:nvPr/>
         </p:nvPicPr>
         <p:blipFill>
-          <a:blip r:embed="rId3"/>
+          <a:blip r:embed="rId3">
+            <a:extLst>
+              <a:ext uri="{28A0092B-C50C-407E-A947-70E740481C1C}">
+                <a14:useLocalDpi xmlns:a14="http://schemas.microsoft.com/office/drawing/2010/main" val="0"/>
+              </a:ext>
+            </a:extLst>
+          </a:blip>
           <a:stretch>
             <a:fillRect/>
           </a:stretch>
         </p:blipFill>
         <p:spPr>
           <a:xfrm>
-            <a:off x="6474551" y="255648"/>
-            <a:ext cx="4238625" cy="6257925"/>
+            <a:off x="649075" y="0"/>
+            <a:ext cx="5143500" cy="6858000"/>
           </a:xfrm>
           <a:prstGeom prst="rect">
             <a:avLst/>
@@ -3697,10 +3714,10 @@
       </p:grpSpPr>
       <p:pic>
         <p:nvPicPr>
-          <p:cNvPr id="5" name="Picture 4">
-            <a:extLst>
-              <a:ext uri="{FF2B5EF4-FFF2-40B4-BE49-F238E27FC236}">
-                <a16:creationId xmlns:a16="http://schemas.microsoft.com/office/drawing/2014/main" id="{E5993E39-2846-FABF-5D88-43B9CA467E8C}"/>
+          <p:cNvPr id="7" name="Picture 6">
+            <a:extLst>
+              <a:ext uri="{FF2B5EF4-FFF2-40B4-BE49-F238E27FC236}">
+                <a16:creationId xmlns:a16="http://schemas.microsoft.com/office/drawing/2014/main" id="{73B991DA-BDAC-52CA-8529-CD89224672CE}"/>
               </a:ext>
             </a:extLst>
           </p:cNvPr>
@@ -3717,8 +3734,8 @@
         </p:blipFill>
         <p:spPr>
           <a:xfrm>
-            <a:off x="1028957" y="0"/>
-            <a:ext cx="5198102" cy="6858000"/>
+            <a:off x="6425629" y="240484"/>
+            <a:ext cx="4276725" cy="6181725"/>
           </a:xfrm>
           <a:prstGeom prst="rect">
             <a:avLst/>
@@ -3727,10 +3744,10 @@
       </p:pic>
       <p:pic>
         <p:nvPicPr>
-          <p:cNvPr id="7" name="Picture 6">
-            <a:extLst>
-              <a:ext uri="{FF2B5EF4-FFF2-40B4-BE49-F238E27FC236}">
-                <a16:creationId xmlns:a16="http://schemas.microsoft.com/office/drawing/2014/main" id="{73B991DA-BDAC-52CA-8529-CD89224672CE}"/>
+          <p:cNvPr id="3" name="Picture 2" descr="A vertical chart with numbers&#10;&#10;Description automatically generated">
+            <a:extLst>
+              <a:ext uri="{FF2B5EF4-FFF2-40B4-BE49-F238E27FC236}">
+                <a16:creationId xmlns:a16="http://schemas.microsoft.com/office/drawing/2014/main" id="{58831F5E-A5B9-559E-3500-706D9094071D}"/>
               </a:ext>
             </a:extLst>
           </p:cNvPr>
@@ -3740,15 +3757,21 @@
           <p:nvPr/>
         </p:nvPicPr>
         <p:blipFill>
-          <a:blip r:embed="rId3"/>
+          <a:blip r:embed="rId3">
+            <a:extLst>
+              <a:ext uri="{28A0092B-C50C-407E-A947-70E740481C1C}">
+                <a14:useLocalDpi xmlns:a14="http://schemas.microsoft.com/office/drawing/2010/main" val="0"/>
+              </a:ext>
+            </a:extLst>
+          </a:blip>
           <a:stretch>
             <a:fillRect/>
           </a:stretch>
         </p:blipFill>
         <p:spPr>
           <a:xfrm>
-            <a:off x="6425629" y="240484"/>
-            <a:ext cx="4276725" cy="6181725"/>
+            <a:off x="622872" y="0"/>
+            <a:ext cx="5143500" cy="6858000"/>
           </a:xfrm>
           <a:prstGeom prst="rect">
             <a:avLst/>

</xml_diff>